<commit_message>
Orden del sistema de ficheros
Se ordena el sistema de ficheros para su presentación
</commit_message>
<xml_diff>
--- a/Poster/poster4.pptx
+++ b/Poster/poster4.pptx
@@ -1273,7 +1273,7 @@
           <a:p>
             <a:fld id="{4B6ED0B7-3068-4DD5-A203-46815913B43F}" type="datetimeFigureOut">
               <a:rPr lang="es-ES" smtClean="0"/>
-              <a:t>28/06/2019</a:t>
+              <a:t>02/07/2019</a:t>
             </a:fld>
             <a:endParaRPr lang="es-ES" dirty="0"/>
           </a:p>
@@ -1465,7 +1465,7 @@
           <a:p>
             <a:fld id="{4B6ED0B7-3068-4DD5-A203-46815913B43F}" type="datetimeFigureOut">
               <a:rPr lang="es-ES" smtClean="0"/>
-              <a:t>28/06/2019</a:t>
+              <a:t>02/07/2019</a:t>
             </a:fld>
             <a:endParaRPr lang="es-ES" dirty="0"/>
           </a:p>
@@ -1645,7 +1645,7 @@
           <a:p>
             <a:fld id="{4B6ED0B7-3068-4DD5-A203-46815913B43F}" type="datetimeFigureOut">
               <a:rPr lang="es-ES" smtClean="0"/>
-              <a:t>28/06/2019</a:t>
+              <a:t>02/07/2019</a:t>
             </a:fld>
             <a:endParaRPr lang="es-ES" dirty="0"/>
           </a:p>
@@ -1815,7 +1815,7 @@
           <a:p>
             <a:fld id="{4B6ED0B7-3068-4DD5-A203-46815913B43F}" type="datetimeFigureOut">
               <a:rPr lang="es-ES" smtClean="0"/>
-              <a:t>28/06/2019</a:t>
+              <a:t>02/07/2019</a:t>
             </a:fld>
             <a:endParaRPr lang="es-ES" dirty="0"/>
           </a:p>
@@ -2069,7 +2069,7 @@
           <a:p>
             <a:fld id="{4B6ED0B7-3068-4DD5-A203-46815913B43F}" type="datetimeFigureOut">
               <a:rPr lang="es-ES" smtClean="0"/>
-              <a:t>28/06/2019</a:t>
+              <a:t>02/07/2019</a:t>
             </a:fld>
             <a:endParaRPr lang="es-ES" dirty="0"/>
           </a:p>
@@ -2395,7 +2395,7 @@
           <a:p>
             <a:fld id="{4B6ED0B7-3068-4DD5-A203-46815913B43F}" type="datetimeFigureOut">
               <a:rPr lang="es-ES" smtClean="0"/>
-              <a:t>28/06/2019</a:t>
+              <a:t>02/07/2019</a:t>
             </a:fld>
             <a:endParaRPr lang="es-ES" dirty="0"/>
           </a:p>
@@ -2815,7 +2815,7 @@
           <a:p>
             <a:fld id="{4B6ED0B7-3068-4DD5-A203-46815913B43F}" type="datetimeFigureOut">
               <a:rPr lang="es-ES" smtClean="0"/>
-              <a:t>28/06/2019</a:t>
+              <a:t>02/07/2019</a:t>
             </a:fld>
             <a:endParaRPr lang="es-ES" dirty="0"/>
           </a:p>
@@ -2933,7 +2933,7 @@
           <a:p>
             <a:fld id="{4B6ED0B7-3068-4DD5-A203-46815913B43F}" type="datetimeFigureOut">
               <a:rPr lang="es-ES" smtClean="0"/>
-              <a:t>28/06/2019</a:t>
+              <a:t>02/07/2019</a:t>
             </a:fld>
             <a:endParaRPr lang="es-ES" dirty="0"/>
           </a:p>
@@ -3028,7 +3028,7 @@
           <a:p>
             <a:fld id="{4B6ED0B7-3068-4DD5-A203-46815913B43F}" type="datetimeFigureOut">
               <a:rPr lang="es-ES" smtClean="0"/>
-              <a:t>28/06/2019</a:t>
+              <a:t>02/07/2019</a:t>
             </a:fld>
             <a:endParaRPr lang="es-ES" dirty="0"/>
           </a:p>
@@ -3315,7 +3315,7 @@
           <a:p>
             <a:fld id="{4B6ED0B7-3068-4DD5-A203-46815913B43F}" type="datetimeFigureOut">
               <a:rPr lang="es-ES" smtClean="0"/>
-              <a:t>28/06/2019</a:t>
+              <a:t>02/07/2019</a:t>
             </a:fld>
             <a:endParaRPr lang="es-ES" dirty="0"/>
           </a:p>
@@ -3640,7 +3640,7 @@
           <a:p>
             <a:fld id="{4B6ED0B7-3068-4DD5-A203-46815913B43F}" type="datetimeFigureOut">
               <a:rPr lang="es-ES" smtClean="0"/>
-              <a:t>28/06/2019</a:t>
+              <a:t>02/07/2019</a:t>
             </a:fld>
             <a:endParaRPr lang="es-ES" dirty="0"/>
           </a:p>
@@ -3894,7 +3894,7 @@
           <a:p>
             <a:fld id="{4B6ED0B7-3068-4DD5-A203-46815913B43F}" type="datetimeFigureOut">
               <a:rPr lang="es-ES" smtClean="0"/>
-              <a:t>28/06/2019</a:t>
+              <a:t>02/07/2019</a:t>
             </a:fld>
             <a:endParaRPr lang="es-ES" dirty="0"/>
           </a:p>
@@ -5789,14 +5789,14 @@
               <a:t>Tutor: Antonio Jesús Canepa </a:t>
             </a:r>
             <a:r>
-              <a:rPr lang="es-ES" sz="4400" u="sng" dirty="0" err="1">
+              <a:rPr lang="es-ES" sz="4400" dirty="0" err="1">
                 <a:solidFill>
                   <a:srgbClr val="D9D9D9"/>
                 </a:solidFill>
               </a:rPr>
               <a:t>Oneto</a:t>
             </a:r>
-            <a:endParaRPr lang="es-ES" sz="4400" u="sng" dirty="0">
+            <a:endParaRPr lang="es-ES" sz="4400" dirty="0">
               <a:solidFill>
                 <a:srgbClr val="D9D9D9"/>
               </a:solidFill>
@@ -6151,10 +6151,10 @@
       </p:sp>
       <p:pic>
         <p:nvPicPr>
-          <p:cNvPr id="16" name="Imagen 15">
+          <p:cNvPr id="23" name="Imagen 22">
             <a:extLst>
               <a:ext uri="{FF2B5EF4-FFF2-40B4-BE49-F238E27FC236}">
-                <a16:creationId xmlns:a16="http://schemas.microsoft.com/office/drawing/2014/main" id="{48D964D7-E88B-405D-8345-3EC2A20880DA}"/>
+                <a16:creationId xmlns:a16="http://schemas.microsoft.com/office/drawing/2014/main" id="{65FC5833-A4E8-42A1-9AE6-048B81D1235A}"/>
               </a:ext>
             </a:extLst>
           </p:cNvPr>
@@ -6177,8 +6177,8 @@
         </p:blipFill>
         <p:spPr>
           <a:xfrm>
-            <a:off x="10339491" y="21322356"/>
-            <a:ext cx="9319258" cy="2008663"/>
+            <a:off x="17588793" y="9244558"/>
+            <a:ext cx="3061434" cy="4081912"/>
           </a:xfrm>
           <a:prstGeom prst="rect">
             <a:avLst/>
@@ -6187,10 +6187,10 @@
       </p:pic>
       <p:pic>
         <p:nvPicPr>
-          <p:cNvPr id="23" name="Imagen 22">
+          <p:cNvPr id="26" name="Imagen 25">
             <a:extLst>
               <a:ext uri="{FF2B5EF4-FFF2-40B4-BE49-F238E27FC236}">
-                <a16:creationId xmlns:a16="http://schemas.microsoft.com/office/drawing/2014/main" id="{65FC5833-A4E8-42A1-9AE6-048B81D1235A}"/>
+                <a16:creationId xmlns:a16="http://schemas.microsoft.com/office/drawing/2014/main" id="{1F15449C-D6AE-49A5-B0DB-8C41F2F8687D}"/>
               </a:ext>
             </a:extLst>
           </p:cNvPr>
@@ -6213,7 +6213,7 @@
         </p:blipFill>
         <p:spPr>
           <a:xfrm>
-            <a:off x="17588793" y="9244558"/>
+            <a:off x="21388181" y="9244558"/>
             <a:ext cx="3061434" cy="4081912"/>
           </a:xfrm>
           <a:prstGeom prst="rect">
@@ -6223,10 +6223,10 @@
       </p:pic>
       <p:pic>
         <p:nvPicPr>
-          <p:cNvPr id="26" name="Imagen 25">
+          <p:cNvPr id="28" name="Imagen 27">
             <a:extLst>
               <a:ext uri="{FF2B5EF4-FFF2-40B4-BE49-F238E27FC236}">
-                <a16:creationId xmlns:a16="http://schemas.microsoft.com/office/drawing/2014/main" id="{1F15449C-D6AE-49A5-B0DB-8C41F2F8687D}"/>
+                <a16:creationId xmlns:a16="http://schemas.microsoft.com/office/drawing/2014/main" id="{E80CC852-5CB6-45A1-B51C-27D5F9E96D42}"/>
               </a:ext>
             </a:extLst>
           </p:cNvPr>
@@ -6249,7 +6249,7 @@
         </p:blipFill>
         <p:spPr>
           <a:xfrm>
-            <a:off x="21388181" y="9244558"/>
+            <a:off x="25189540" y="9265163"/>
             <a:ext cx="3061434" cy="4081912"/>
           </a:xfrm>
           <a:prstGeom prst="rect">
@@ -6259,10 +6259,10 @@
       </p:pic>
       <p:pic>
         <p:nvPicPr>
-          <p:cNvPr id="28" name="Imagen 27">
+          <p:cNvPr id="9" name="Imagen 8">
             <a:extLst>
               <a:ext uri="{FF2B5EF4-FFF2-40B4-BE49-F238E27FC236}">
-                <a16:creationId xmlns:a16="http://schemas.microsoft.com/office/drawing/2014/main" id="{E80CC852-5CB6-45A1-B51C-27D5F9E96D42}"/>
+                <a16:creationId xmlns:a16="http://schemas.microsoft.com/office/drawing/2014/main" id="{170213D4-ACB7-40A8-9F58-69DA3DF28268}"/>
               </a:ext>
             </a:extLst>
           </p:cNvPr>
@@ -6285,7 +6285,7 @@
         </p:blipFill>
         <p:spPr>
           <a:xfrm>
-            <a:off x="25189540" y="9265163"/>
+            <a:off x="17586823" y="13726273"/>
             <a:ext cx="3061434" cy="4081912"/>
           </a:xfrm>
           <a:prstGeom prst="rect">
@@ -6295,10 +6295,10 @@
       </p:pic>
       <p:pic>
         <p:nvPicPr>
-          <p:cNvPr id="9" name="Imagen 8">
+          <p:cNvPr id="19" name="Imagen 18">
             <a:extLst>
               <a:ext uri="{FF2B5EF4-FFF2-40B4-BE49-F238E27FC236}">
-                <a16:creationId xmlns:a16="http://schemas.microsoft.com/office/drawing/2014/main" id="{170213D4-ACB7-40A8-9F58-69DA3DF28268}"/>
+                <a16:creationId xmlns:a16="http://schemas.microsoft.com/office/drawing/2014/main" id="{2F8022BE-BE0E-4368-855E-1EB95B5D1113}"/>
               </a:ext>
             </a:extLst>
           </p:cNvPr>
@@ -6321,7 +6321,7 @@
         </p:blipFill>
         <p:spPr>
           <a:xfrm>
-            <a:off x="17586823" y="13726273"/>
+            <a:off x="21402618" y="13737051"/>
             <a:ext cx="3061434" cy="4081912"/>
           </a:xfrm>
           <a:prstGeom prst="rect">
@@ -6331,10 +6331,10 @@
       </p:pic>
       <p:pic>
         <p:nvPicPr>
-          <p:cNvPr id="19" name="Imagen 18">
+          <p:cNvPr id="21" name="Imagen 20">
             <a:extLst>
               <a:ext uri="{FF2B5EF4-FFF2-40B4-BE49-F238E27FC236}">
-                <a16:creationId xmlns:a16="http://schemas.microsoft.com/office/drawing/2014/main" id="{2F8022BE-BE0E-4368-855E-1EB95B5D1113}"/>
+                <a16:creationId xmlns:a16="http://schemas.microsoft.com/office/drawing/2014/main" id="{80E094D5-2AAC-4A2E-829F-0311BB502BF9}"/>
               </a:ext>
             </a:extLst>
           </p:cNvPr>
@@ -6357,8 +6357,8 @@
         </p:blipFill>
         <p:spPr>
           <a:xfrm>
-            <a:off x="21402618" y="13737051"/>
-            <a:ext cx="3061434" cy="4081912"/>
+            <a:off x="25163999" y="13726273"/>
+            <a:ext cx="3059129" cy="4078839"/>
           </a:xfrm>
           <a:prstGeom prst="rect">
             <a:avLst/>
@@ -6367,10 +6367,10 @@
       </p:pic>
       <p:pic>
         <p:nvPicPr>
-          <p:cNvPr id="21" name="Imagen 20">
+          <p:cNvPr id="10" name="Imagen 9">
             <a:extLst>
               <a:ext uri="{FF2B5EF4-FFF2-40B4-BE49-F238E27FC236}">
-                <a16:creationId xmlns:a16="http://schemas.microsoft.com/office/drawing/2014/main" id="{80E094D5-2AAC-4A2E-829F-0311BB502BF9}"/>
+                <a16:creationId xmlns:a16="http://schemas.microsoft.com/office/drawing/2014/main" id="{1A40D0C6-DF8B-458E-A77C-8BBE99775DF5}"/>
               </a:ext>
             </a:extLst>
           </p:cNvPr>
@@ -6393,8 +6393,8 @@
         </p:blipFill>
         <p:spPr>
           <a:xfrm>
-            <a:off x="25163999" y="13726273"/>
-            <a:ext cx="3059129" cy="4078839"/>
+            <a:off x="10271475" y="21111650"/>
+            <a:ext cx="9774709" cy="2012440"/>
           </a:xfrm>
           <a:prstGeom prst="rect">
             <a:avLst/>

</xml_diff>